<commit_message>
update course with lesson materials
</commit_message>
<xml_diff>
--- a/resources/hw/genomic-data-visualization-HW_2.pptx
+++ b/resources/hw/genomic-data-visualization-HW_2.pptx
@@ -9,6 +9,8 @@
     <p:sldId id="269" r:id="rId3"/>
     <p:sldId id="265" r:id="rId4"/>
     <p:sldId id="268" r:id="rId5"/>
+    <p:sldId id="271" r:id="rId6"/>
+    <p:sldId id="270" r:id="rId7"/>
   </p:sldIdLst>
   <p:sldSz cx="12192000" cy="6858000"/>
   <p:notesSz cx="6858000" cy="9144000"/>
@@ -3497,16 +3499,7 @@
             </a:pPr>
             <a:r>
               <a:rPr lang="en-US" dirty="0"/>
-              <a:t>Do you think the author was effective in making salient the point they said they wanted to make? Why or why not?</a:t>
-            </a:r>
-          </a:p>
-          <a:p>
-            <a:pPr marL="971550" lvl="1" indent="-514350">
-              <a:buAutoNum type="arabicPeriod"/>
-            </a:pPr>
-            <a:r>
-              <a:rPr lang="en-US" dirty="0"/>
-              <a:t>How could you improve the data visualization in making salient the point they said they wanted to make? If you don’t think the data visualization can be improved, explain why the data visualization is already effective. </a:t>
+              <a:t>Do you think the author was effective in making salient the point they said they wanted to make? How could you improve the data visualization in making salient the point they said they wanted to make? If you don’t think the data visualization can be improved, explain why the data visualization is already effective. </a:t>
             </a:r>
           </a:p>
           <a:p>
@@ -3731,6 +3724,266 @@
     <p:extLst>
       <p:ext uri="{BB962C8B-B14F-4D97-AF65-F5344CB8AC3E}">
         <p14:creationId xmlns:p14="http://schemas.microsoft.com/office/powerpoint/2010/main" val="312889661"/>
+      </p:ext>
+    </p:extLst>
+  </p:cSld>
+  <p:clrMapOvr>
+    <a:masterClrMapping/>
+  </p:clrMapOvr>
+</p:sld>
+</file>
+
+<file path=ppt/slides/slide5.xml><?xml version="1.0" encoding="utf-8"?>
+<p:sld xmlns:a="http://schemas.openxmlformats.org/drawingml/2006/main" xmlns:r="http://schemas.openxmlformats.org/officeDocument/2006/relationships" xmlns:p="http://schemas.openxmlformats.org/presentationml/2006/main">
+  <p:cSld>
+    <p:spTree>
+      <p:nvGrpSpPr>
+        <p:cNvPr id="1" name=""/>
+        <p:cNvGrpSpPr/>
+        <p:nvPr/>
+      </p:nvGrpSpPr>
+      <p:grpSpPr>
+        <a:xfrm>
+          <a:off x="0" y="0"/>
+          <a:ext cx="0" cy="0"/>
+          <a:chOff x="0" y="0"/>
+          <a:chExt cx="0" cy="0"/>
+        </a:xfrm>
+      </p:grpSpPr>
+      <p:sp>
+        <p:nvSpPr>
+          <p:cNvPr id="4" name="Title 3">
+            <a:extLst>
+              <a:ext uri="{FF2B5EF4-FFF2-40B4-BE49-F238E27FC236}">
+                <a16:creationId xmlns:a16="http://schemas.microsoft.com/office/drawing/2014/main" id="{3A14E3D3-CEFF-A440-953D-97FBCB2BE115}"/>
+              </a:ext>
+            </a:extLst>
+          </p:cNvPr>
+          <p:cNvSpPr>
+            <a:spLocks noGrp="1"/>
+          </p:cNvSpPr>
+          <p:nvPr>
+            <p:ph type="ctrTitle"/>
+          </p:nvPr>
+        </p:nvSpPr>
+        <p:spPr/>
+        <p:txBody>
+          <a:bodyPr/>
+          <a:lstStyle/>
+          <a:p>
+            <a:r>
+              <a:rPr lang="en-US" dirty="0"/>
+              <a:t>Assignments</a:t>
+            </a:r>
+          </a:p>
+        </p:txBody>
+      </p:sp>
+    </p:spTree>
+    <p:extLst>
+      <p:ext uri="{BB962C8B-B14F-4D97-AF65-F5344CB8AC3E}">
+        <p14:creationId xmlns:p14="http://schemas.microsoft.com/office/powerpoint/2010/main" val="2344957723"/>
+      </p:ext>
+    </p:extLst>
+  </p:cSld>
+  <p:clrMapOvr>
+    <a:masterClrMapping/>
+  </p:clrMapOvr>
+</p:sld>
+</file>
+
+<file path=ppt/slides/slide6.xml><?xml version="1.0" encoding="utf-8"?>
+<p:sld xmlns:a="http://schemas.openxmlformats.org/drawingml/2006/main" xmlns:r="http://schemas.openxmlformats.org/officeDocument/2006/relationships" xmlns:p="http://schemas.openxmlformats.org/presentationml/2006/main">
+  <p:cSld>
+    <p:spTree>
+      <p:nvGrpSpPr>
+        <p:cNvPr id="1" name=""/>
+        <p:cNvGrpSpPr/>
+        <p:nvPr/>
+      </p:nvGrpSpPr>
+      <p:grpSpPr>
+        <a:xfrm>
+          <a:off x="0" y="0"/>
+          <a:ext cx="0" cy="0"/>
+          <a:chOff x="0" y="0"/>
+          <a:chExt cx="0" cy="0"/>
+        </a:xfrm>
+      </p:grpSpPr>
+      <p:sp>
+        <p:nvSpPr>
+          <p:cNvPr id="2" name="Title 1">
+            <a:extLst>
+              <a:ext uri="{FF2B5EF4-FFF2-40B4-BE49-F238E27FC236}">
+                <a16:creationId xmlns:a16="http://schemas.microsoft.com/office/drawing/2014/main" id="{9F76F879-D6B7-409D-737B-FEF09A5CCD61}"/>
+              </a:ext>
+            </a:extLst>
+          </p:cNvPr>
+          <p:cNvSpPr>
+            <a:spLocks noGrp="1"/>
+          </p:cNvSpPr>
+          <p:nvPr>
+            <p:ph type="title"/>
+          </p:nvPr>
+        </p:nvSpPr>
+        <p:spPr/>
+        <p:txBody>
+          <a:bodyPr/>
+          <a:lstStyle/>
+          <a:p>
+            <a:r>
+              <a:rPr lang="en-US" dirty="0"/>
+              <a:t>Within team</a:t>
+            </a:r>
+          </a:p>
+        </p:txBody>
+      </p:sp>
+      <p:sp>
+        <p:nvSpPr>
+          <p:cNvPr id="3" name="Content Placeholder 2">
+            <a:extLst>
+              <a:ext uri="{FF2B5EF4-FFF2-40B4-BE49-F238E27FC236}">
+                <a16:creationId xmlns:a16="http://schemas.microsoft.com/office/drawing/2014/main" id="{3F98111F-13FE-6202-6BB3-C3B23A5CC3EA}"/>
+              </a:ext>
+            </a:extLst>
+          </p:cNvPr>
+          <p:cNvSpPr>
+            <a:spLocks noGrp="1"/>
+          </p:cNvSpPr>
+          <p:nvPr>
+            <p:ph idx="1"/>
+          </p:nvPr>
+        </p:nvSpPr>
+        <p:spPr>
+          <a:xfrm>
+            <a:off x="838200" y="1825625"/>
+            <a:ext cx="10515600" cy="3899314"/>
+          </a:xfrm>
+        </p:spPr>
+        <p:txBody>
+          <a:bodyPr>
+            <a:normAutofit/>
+          </a:bodyPr>
+          <a:lstStyle/>
+          <a:p>
+            <a:endParaRPr lang="en-US" sz="2200" dirty="0"/>
+          </a:p>
+          <a:p>
+            <a:r>
+              <a:rPr lang="en-US" sz="2200" dirty="0"/>
+              <a:t>Rafael -&gt; Rebeca -&gt; An -&gt; Rafael 			# </a:t>
+            </a:r>
+            <a:r>
+              <a:rPr lang="en-US" sz="2200" dirty="0" err="1"/>
+              <a:t>pikachu</a:t>
+            </a:r>
+            <a:endParaRPr lang="en-US" sz="2200" dirty="0"/>
+          </a:p>
+          <a:p>
+            <a:endParaRPr lang="en-US" sz="2200" dirty="0"/>
+          </a:p>
+          <a:p>
+            <a:r>
+              <a:rPr lang="en-US" sz="2200" dirty="0"/>
+              <a:t>Andrew-&gt; Gary -&gt; </a:t>
+            </a:r>
+            <a:r>
+              <a:rPr lang="en-US" sz="2200" dirty="0" err="1"/>
+              <a:t>Moneera</a:t>
+            </a:r>
+            <a:r>
+              <a:rPr lang="en-US" sz="2200" dirty="0"/>
+              <a:t> -&gt; Andrew			# </a:t>
+            </a:r>
+            <a:r>
+              <a:rPr lang="en-US" sz="2200" dirty="0" err="1"/>
+              <a:t>squirtle</a:t>
+            </a:r>
+            <a:endParaRPr lang="en-US" sz="2200" dirty="0"/>
+          </a:p>
+          <a:p>
+            <a:endParaRPr lang="en-US" sz="2200" dirty="0"/>
+          </a:p>
+          <a:p>
+            <a:r>
+              <a:rPr lang="en-US" sz="2200" dirty="0"/>
+              <a:t>Wendy -&gt; Ryan -&gt; Eric -&gt; Todd -&gt; Wendy		# </a:t>
+            </a:r>
+            <a:r>
+              <a:rPr lang="en-US" sz="2200" dirty="0" err="1"/>
+              <a:t>charmander</a:t>
+            </a:r>
+            <a:endParaRPr lang="en-US" sz="2200" dirty="0"/>
+          </a:p>
+          <a:p>
+            <a:endParaRPr lang="en-US" sz="2200" dirty="0"/>
+          </a:p>
+          <a:p>
+            <a:r>
+              <a:rPr lang="en-US" sz="2200" dirty="0" err="1"/>
+              <a:t>Gohta</a:t>
+            </a:r>
+            <a:r>
+              <a:rPr lang="en-US" sz="2200" dirty="0"/>
+              <a:t> -&gt; Gwyn -&gt; X. Gu -&gt; </a:t>
+            </a:r>
+            <a:r>
+              <a:rPr lang="en-US" sz="2200" dirty="0" err="1"/>
+              <a:t>Gohta</a:t>
+            </a:r>
+            <a:r>
+              <a:rPr lang="en-US" sz="2200" dirty="0"/>
+              <a:t> 			# </a:t>
+            </a:r>
+            <a:r>
+              <a:rPr lang="en-US" sz="2200" dirty="0" err="1"/>
+              <a:t>bulbasaur</a:t>
+            </a:r>
+            <a:endParaRPr lang="en-US" sz="2200" dirty="0"/>
+          </a:p>
+        </p:txBody>
+      </p:sp>
+      <p:sp>
+        <p:nvSpPr>
+          <p:cNvPr id="4" name="TextBox 3">
+            <a:extLst>
+              <a:ext uri="{FF2B5EF4-FFF2-40B4-BE49-F238E27FC236}">
+                <a16:creationId xmlns:a16="http://schemas.microsoft.com/office/drawing/2014/main" id="{2EBB1255-3942-6F6D-E007-43E36F5C5391}"/>
+              </a:ext>
+            </a:extLst>
+          </p:cNvPr>
+          <p:cNvSpPr txBox="1"/>
+          <p:nvPr/>
+        </p:nvSpPr>
+        <p:spPr>
+          <a:xfrm>
+            <a:off x="838200" y="5727354"/>
+            <a:ext cx="2317045" cy="477054"/>
+          </a:xfrm>
+          <a:prstGeom prst="rect">
+            <a:avLst/>
+          </a:prstGeom>
+          <a:noFill/>
+        </p:spPr>
+        <p:txBody>
+          <a:bodyPr wrap="none" rtlCol="0">
+            <a:spAutoFit/>
+          </a:bodyPr>
+          <a:lstStyle/>
+          <a:p>
+            <a:r>
+              <a:rPr lang="en-US" sz="2500" b="1" dirty="0" err="1"/>
+              <a:t>bit.ly</a:t>
+            </a:r>
+            <a:r>
+              <a:rPr lang="en-US" sz="2500" b="1" dirty="0"/>
+              <a:t>/GDV23_rc</a:t>
+            </a:r>
+          </a:p>
+        </p:txBody>
+      </p:sp>
+    </p:spTree>
+    <p:extLst>
+      <p:ext uri="{BB962C8B-B14F-4D97-AF65-F5344CB8AC3E}">
+        <p14:creationId xmlns:p14="http://schemas.microsoft.com/office/powerpoint/2010/main" val="2602200212"/>
       </p:ext>
     </p:extLst>
   </p:cSld>

</xml_diff>